<commit_message>
finished the slides and added the PDF version
</commit_message>
<xml_diff>
--- a/Wk5/Source Code Version Control Using Git.pptx
+++ b/Wk5/Source Code Version Control Using Git.pptx
@@ -6,14 +6,22 @@
   </p:sldMasterIdLst>
   <p:sldIdLst>
     <p:sldId id="256" r:id="rId2"/>
-    <p:sldId id="257" r:id="rId3"/>
-    <p:sldId id="258" r:id="rId4"/>
-    <p:sldId id="259" r:id="rId5"/>
-    <p:sldId id="260" r:id="rId6"/>
-    <p:sldId id="261" r:id="rId7"/>
-    <p:sldId id="262" r:id="rId8"/>
-    <p:sldId id="263" r:id="rId9"/>
-    <p:sldId id="264" r:id="rId10"/>
+    <p:sldId id="266" r:id="rId3"/>
+    <p:sldId id="257" r:id="rId4"/>
+    <p:sldId id="273" r:id="rId5"/>
+    <p:sldId id="258" r:id="rId6"/>
+    <p:sldId id="259" r:id="rId7"/>
+    <p:sldId id="260" r:id="rId8"/>
+    <p:sldId id="261" r:id="rId9"/>
+    <p:sldId id="269" r:id="rId10"/>
+    <p:sldId id="262" r:id="rId11"/>
+    <p:sldId id="270" r:id="rId12"/>
+    <p:sldId id="263" r:id="rId13"/>
+    <p:sldId id="264" r:id="rId14"/>
+    <p:sldId id="268" r:id="rId15"/>
+    <p:sldId id="271" r:id="rId16"/>
+    <p:sldId id="272" r:id="rId17"/>
+    <p:sldId id="274" r:id="rId18"/>
   </p:sldIdLst>
   <p:sldSz cx="9144000" cy="6858000" type="screen4x3"/>
   <p:notesSz cx="6858000" cy="9144000"/>
@@ -296,7 +304,8 @@
           <a:p>
             <a:fld id="{3B1A0F7E-51BD-4280-BE6C-3A5480020631}" type="datetimeFigureOut">
               <a:rPr lang="en-US" smtClean="0"/>
-              <a:t>1/11/2011</a:t>
+              <a:pPr/>
+              <a:t>1/12/2011</a:t>
             </a:fld>
             <a:endParaRPr lang="en-GB"/>
           </a:p>
@@ -338,6 +347,7 @@
           <a:p>
             <a:fld id="{4CDF7683-110C-46D9-99E0-495E9C14EF50}" type="slidenum">
               <a:rPr lang="en-GB" smtClean="0"/>
+              <a:pPr/>
               <a:t>‹#›</a:t>
             </a:fld>
             <a:endParaRPr lang="en-GB"/>
@@ -461,7 +471,8 @@
           <a:p>
             <a:fld id="{3B1A0F7E-51BD-4280-BE6C-3A5480020631}" type="datetimeFigureOut">
               <a:rPr lang="en-US" smtClean="0"/>
-              <a:t>1/11/2011</a:t>
+              <a:pPr/>
+              <a:t>1/12/2011</a:t>
             </a:fld>
             <a:endParaRPr lang="en-GB"/>
           </a:p>
@@ -503,6 +514,7 @@
           <a:p>
             <a:fld id="{4CDF7683-110C-46D9-99E0-495E9C14EF50}" type="slidenum">
               <a:rPr lang="en-GB" smtClean="0"/>
+              <a:pPr/>
               <a:t>‹#›</a:t>
             </a:fld>
             <a:endParaRPr lang="en-GB"/>
@@ -636,7 +648,8 @@
           <a:p>
             <a:fld id="{3B1A0F7E-51BD-4280-BE6C-3A5480020631}" type="datetimeFigureOut">
               <a:rPr lang="en-US" smtClean="0"/>
-              <a:t>1/11/2011</a:t>
+              <a:pPr/>
+              <a:t>1/12/2011</a:t>
             </a:fld>
             <a:endParaRPr lang="en-GB"/>
           </a:p>
@@ -678,6 +691,7 @@
           <a:p>
             <a:fld id="{4CDF7683-110C-46D9-99E0-495E9C14EF50}" type="slidenum">
               <a:rPr lang="en-GB" smtClean="0"/>
+              <a:pPr/>
               <a:t>‹#›</a:t>
             </a:fld>
             <a:endParaRPr lang="en-GB"/>
@@ -801,7 +815,8 @@
           <a:p>
             <a:fld id="{3B1A0F7E-51BD-4280-BE6C-3A5480020631}" type="datetimeFigureOut">
               <a:rPr lang="en-US" smtClean="0"/>
-              <a:t>1/11/2011</a:t>
+              <a:pPr/>
+              <a:t>1/12/2011</a:t>
             </a:fld>
             <a:endParaRPr lang="en-GB"/>
           </a:p>
@@ -843,6 +858,7 @@
           <a:p>
             <a:fld id="{4CDF7683-110C-46D9-99E0-495E9C14EF50}" type="slidenum">
               <a:rPr lang="en-GB" smtClean="0"/>
+              <a:pPr/>
               <a:t>‹#›</a:t>
             </a:fld>
             <a:endParaRPr lang="en-GB"/>
@@ -1042,7 +1058,8 @@
           <a:p>
             <a:fld id="{3B1A0F7E-51BD-4280-BE6C-3A5480020631}" type="datetimeFigureOut">
               <a:rPr lang="en-US" smtClean="0"/>
-              <a:t>1/11/2011</a:t>
+              <a:pPr/>
+              <a:t>1/12/2011</a:t>
             </a:fld>
             <a:endParaRPr lang="en-GB"/>
           </a:p>
@@ -1084,6 +1101,7 @@
           <a:p>
             <a:fld id="{4CDF7683-110C-46D9-99E0-495E9C14EF50}" type="slidenum">
               <a:rPr lang="en-GB" smtClean="0"/>
+              <a:pPr/>
               <a:t>‹#›</a:t>
             </a:fld>
             <a:endParaRPr lang="en-GB"/>
@@ -1325,7 +1343,8 @@
           <a:p>
             <a:fld id="{3B1A0F7E-51BD-4280-BE6C-3A5480020631}" type="datetimeFigureOut">
               <a:rPr lang="en-US" smtClean="0"/>
-              <a:t>1/11/2011</a:t>
+              <a:pPr/>
+              <a:t>1/12/2011</a:t>
             </a:fld>
             <a:endParaRPr lang="en-GB"/>
           </a:p>
@@ -1367,6 +1386,7 @@
           <a:p>
             <a:fld id="{4CDF7683-110C-46D9-99E0-495E9C14EF50}" type="slidenum">
               <a:rPr lang="en-GB" smtClean="0"/>
+              <a:pPr/>
               <a:t>‹#›</a:t>
             </a:fld>
             <a:endParaRPr lang="en-GB"/>
@@ -1742,7 +1762,8 @@
           <a:p>
             <a:fld id="{3B1A0F7E-51BD-4280-BE6C-3A5480020631}" type="datetimeFigureOut">
               <a:rPr lang="en-US" smtClean="0"/>
-              <a:t>1/11/2011</a:t>
+              <a:pPr/>
+              <a:t>1/12/2011</a:t>
             </a:fld>
             <a:endParaRPr lang="en-GB"/>
           </a:p>
@@ -1784,6 +1805,7 @@
           <a:p>
             <a:fld id="{4CDF7683-110C-46D9-99E0-495E9C14EF50}" type="slidenum">
               <a:rPr lang="en-GB" smtClean="0"/>
+              <a:pPr/>
               <a:t>‹#›</a:t>
             </a:fld>
             <a:endParaRPr lang="en-GB"/>
@@ -1855,7 +1877,8 @@
           <a:p>
             <a:fld id="{3B1A0F7E-51BD-4280-BE6C-3A5480020631}" type="datetimeFigureOut">
               <a:rPr lang="en-US" smtClean="0"/>
-              <a:t>1/11/2011</a:t>
+              <a:pPr/>
+              <a:t>1/12/2011</a:t>
             </a:fld>
             <a:endParaRPr lang="en-GB"/>
           </a:p>
@@ -1897,6 +1920,7 @@
           <a:p>
             <a:fld id="{4CDF7683-110C-46D9-99E0-495E9C14EF50}" type="slidenum">
               <a:rPr lang="en-GB" smtClean="0"/>
+              <a:pPr/>
               <a:t>‹#›</a:t>
             </a:fld>
             <a:endParaRPr lang="en-GB"/>
@@ -1945,7 +1969,8 @@
           <a:p>
             <a:fld id="{3B1A0F7E-51BD-4280-BE6C-3A5480020631}" type="datetimeFigureOut">
               <a:rPr lang="en-US" smtClean="0"/>
-              <a:t>1/11/2011</a:t>
+              <a:pPr/>
+              <a:t>1/12/2011</a:t>
             </a:fld>
             <a:endParaRPr lang="en-GB"/>
           </a:p>
@@ -1987,6 +2012,7 @@
           <a:p>
             <a:fld id="{4CDF7683-110C-46D9-99E0-495E9C14EF50}" type="slidenum">
               <a:rPr lang="en-GB" smtClean="0"/>
+              <a:pPr/>
               <a:t>‹#›</a:t>
             </a:fld>
             <a:endParaRPr lang="en-GB"/>
@@ -2217,7 +2243,8 @@
           <a:p>
             <a:fld id="{3B1A0F7E-51BD-4280-BE6C-3A5480020631}" type="datetimeFigureOut">
               <a:rPr lang="en-US" smtClean="0"/>
-              <a:t>1/11/2011</a:t>
+              <a:pPr/>
+              <a:t>1/12/2011</a:t>
             </a:fld>
             <a:endParaRPr lang="en-GB"/>
           </a:p>
@@ -2259,6 +2286,7 @@
           <a:p>
             <a:fld id="{4CDF7683-110C-46D9-99E0-495E9C14EF50}" type="slidenum">
               <a:rPr lang="en-GB" smtClean="0"/>
+              <a:pPr/>
               <a:t>‹#›</a:t>
             </a:fld>
             <a:endParaRPr lang="en-GB"/>
@@ -2465,7 +2493,8 @@
           <a:p>
             <a:fld id="{3B1A0F7E-51BD-4280-BE6C-3A5480020631}" type="datetimeFigureOut">
               <a:rPr lang="en-US" smtClean="0"/>
-              <a:t>1/11/2011</a:t>
+              <a:pPr/>
+              <a:t>1/12/2011</a:t>
             </a:fld>
             <a:endParaRPr lang="en-GB"/>
           </a:p>
@@ -2507,6 +2536,7 @@
           <a:p>
             <a:fld id="{4CDF7683-110C-46D9-99E0-495E9C14EF50}" type="slidenum">
               <a:rPr lang="en-GB" smtClean="0"/>
+              <a:pPr/>
               <a:t>‹#›</a:t>
             </a:fld>
             <a:endParaRPr lang="en-GB"/>
@@ -2673,7 +2703,8 @@
           <a:p>
             <a:fld id="{3B1A0F7E-51BD-4280-BE6C-3A5480020631}" type="datetimeFigureOut">
               <a:rPr lang="en-US" smtClean="0"/>
-              <a:t>1/11/2011</a:t>
+              <a:pPr/>
+              <a:t>1/12/2011</a:t>
             </a:fld>
             <a:endParaRPr lang="en-GB"/>
           </a:p>
@@ -2751,6 +2782,7 @@
           <a:p>
             <a:fld id="{4CDF7683-110C-46D9-99E0-495E9C14EF50}" type="slidenum">
               <a:rPr lang="en-GB" smtClean="0"/>
+              <a:pPr/>
               <a:t>‹#›</a:t>
             </a:fld>
             <a:endParaRPr lang="en-GB"/>
@@ -3090,6 +3122,832 @@
   <p:clrMapOvr>
     <a:masterClrMapping/>
   </p:clrMapOvr>
+  <p:timing>
+    <p:tnLst>
+      <p:par>
+        <p:cTn id="1" dur="indefinite" restart="never" nodeType="tmRoot"/>
+      </p:par>
+    </p:tnLst>
+  </p:timing>
+</p:sld>
+</file>
+
+<file path=ppt/slides/slide10.xml><?xml version="1.0" encoding="utf-8"?>
+<p:sld xmlns:a="http://schemas.openxmlformats.org/drawingml/2006/main" xmlns:r="http://schemas.openxmlformats.org/officeDocument/2006/relationships" xmlns:p="http://schemas.openxmlformats.org/presentationml/2006/main">
+  <p:cSld>
+    <p:spTree>
+      <p:nvGrpSpPr>
+        <p:cNvPr id="1" name=""/>
+        <p:cNvGrpSpPr/>
+        <p:nvPr/>
+      </p:nvGrpSpPr>
+      <p:grpSpPr>
+        <a:xfrm>
+          <a:off x="0" y="0"/>
+          <a:ext cx="0" cy="0"/>
+          <a:chOff x="0" y="0"/>
+          <a:chExt cx="0" cy="0"/>
+        </a:xfrm>
+      </p:grpSpPr>
+      <p:sp>
+        <p:nvSpPr>
+          <p:cNvPr id="2" name="Title 1"/>
+          <p:cNvSpPr>
+            <a:spLocks noGrp="1"/>
+          </p:cNvSpPr>
+          <p:nvPr>
+            <p:ph type="title"/>
+          </p:nvPr>
+        </p:nvSpPr>
+        <p:spPr/>
+        <p:txBody>
+          <a:bodyPr/>
+          <a:lstStyle/>
+          <a:p>
+            <a:r>
+              <a:rPr lang="en-GB" dirty="0" smtClean="0"/>
+              <a:t>Branching and merging</a:t>
+            </a:r>
+            <a:endParaRPr lang="en-GB" dirty="0"/>
+          </a:p>
+        </p:txBody>
+      </p:sp>
+      <p:sp>
+        <p:nvSpPr>
+          <p:cNvPr id="3" name="Content Placeholder 2"/>
+          <p:cNvSpPr>
+            <a:spLocks noGrp="1"/>
+          </p:cNvSpPr>
+          <p:nvPr>
+            <p:ph idx="1"/>
+          </p:nvPr>
+        </p:nvSpPr>
+        <p:spPr/>
+        <p:txBody>
+          <a:bodyPr/>
+          <a:lstStyle/>
+          <a:p>
+            <a:r>
+              <a:rPr lang="en-GB" dirty="0" smtClean="0"/>
+              <a:t>git branch</a:t>
+            </a:r>
+          </a:p>
+          <a:p>
+            <a:pPr>
+              <a:buNone/>
+            </a:pPr>
+            <a:endParaRPr lang="en-GB" dirty="0" smtClean="0"/>
+          </a:p>
+          <a:p>
+            <a:r>
+              <a:rPr lang="en-GB" dirty="0" smtClean="0"/>
+              <a:t>git branch &lt;name&gt;</a:t>
+            </a:r>
+          </a:p>
+          <a:p>
+            <a:r>
+              <a:rPr lang="en-GB" dirty="0" smtClean="0"/>
+              <a:t>git checkout &lt;name&gt;</a:t>
+            </a:r>
+          </a:p>
+          <a:p>
+            <a:pPr>
+              <a:buNone/>
+            </a:pPr>
+            <a:r>
+              <a:rPr lang="en-GB" dirty="0" smtClean="0"/>
+              <a:t>or</a:t>
+            </a:r>
+          </a:p>
+          <a:p>
+            <a:pPr>
+              <a:buNone/>
+            </a:pPr>
+            <a:r>
+              <a:rPr lang="en-GB" dirty="0" smtClean="0"/>
+              <a:t>git checkout –b &lt;name&gt;</a:t>
+            </a:r>
+          </a:p>
+        </p:txBody>
+      </p:sp>
+    </p:spTree>
+  </p:cSld>
+  <p:clrMapOvr>
+    <a:masterClrMapping/>
+  </p:clrMapOvr>
+  <p:timing>
+    <p:tnLst>
+      <p:par>
+        <p:cTn id="1" dur="indefinite" restart="never" nodeType="tmRoot"/>
+      </p:par>
+    </p:tnLst>
+  </p:timing>
+</p:sld>
+</file>
+
+<file path=ppt/slides/slide11.xml><?xml version="1.0" encoding="utf-8"?>
+<p:sld xmlns:a="http://schemas.openxmlformats.org/drawingml/2006/main" xmlns:r="http://schemas.openxmlformats.org/officeDocument/2006/relationships" xmlns:p="http://schemas.openxmlformats.org/presentationml/2006/main">
+  <p:cSld>
+    <p:spTree>
+      <p:nvGrpSpPr>
+        <p:cNvPr id="1" name=""/>
+        <p:cNvGrpSpPr/>
+        <p:nvPr/>
+      </p:nvGrpSpPr>
+      <p:grpSpPr>
+        <a:xfrm>
+          <a:off x="0" y="0"/>
+          <a:ext cx="0" cy="0"/>
+          <a:chOff x="0" y="0"/>
+          <a:chExt cx="0" cy="0"/>
+        </a:xfrm>
+      </p:grpSpPr>
+      <p:sp>
+        <p:nvSpPr>
+          <p:cNvPr id="2" name="Title 1"/>
+          <p:cNvSpPr>
+            <a:spLocks noGrp="1"/>
+          </p:cNvSpPr>
+          <p:nvPr>
+            <p:ph type="title"/>
+          </p:nvPr>
+        </p:nvSpPr>
+        <p:spPr/>
+        <p:txBody>
+          <a:bodyPr/>
+          <a:lstStyle/>
+          <a:p>
+            <a:r>
+              <a:rPr lang="en-GB" dirty="0" smtClean="0"/>
+              <a:t>Branching and merging</a:t>
+            </a:r>
+            <a:endParaRPr lang="en-GB" dirty="0"/>
+          </a:p>
+        </p:txBody>
+      </p:sp>
+      <p:sp>
+        <p:nvSpPr>
+          <p:cNvPr id="3" name="Content Placeholder 2"/>
+          <p:cNvSpPr>
+            <a:spLocks noGrp="1"/>
+          </p:cNvSpPr>
+          <p:nvPr>
+            <p:ph idx="1"/>
+          </p:nvPr>
+        </p:nvSpPr>
+        <p:spPr/>
+        <p:txBody>
+          <a:bodyPr/>
+          <a:lstStyle/>
+          <a:p>
+            <a:r>
+              <a:rPr lang="en-GB" dirty="0" smtClean="0"/>
+              <a:t>git checkout master</a:t>
+            </a:r>
+          </a:p>
+          <a:p>
+            <a:r>
+              <a:rPr lang="en-GB" dirty="0" smtClean="0"/>
+              <a:t>git merge </a:t>
+            </a:r>
+            <a:r>
+              <a:rPr lang="en-GB" dirty="0" err="1" smtClean="0"/>
+              <a:t>my_experimental_branch</a:t>
+            </a:r>
+            <a:endParaRPr lang="en-GB" dirty="0" smtClean="0"/>
+          </a:p>
+          <a:p>
+            <a:pPr>
+              <a:buNone/>
+            </a:pPr>
+            <a:endParaRPr lang="en-GB" dirty="0" smtClean="0"/>
+          </a:p>
+          <a:p>
+            <a:pPr>
+              <a:buNone/>
+            </a:pPr>
+            <a:r>
+              <a:rPr lang="en-GB" dirty="0" smtClean="0"/>
+              <a:t>To see differences between branches:</a:t>
+            </a:r>
+          </a:p>
+          <a:p>
+            <a:pPr>
+              <a:buNone/>
+            </a:pPr>
+            <a:r>
+              <a:rPr lang="en-GB" dirty="0" smtClean="0"/>
+              <a:t>git diff &lt;branch1&gt; &lt;branch2&gt;</a:t>
+            </a:r>
+          </a:p>
+        </p:txBody>
+      </p:sp>
+    </p:spTree>
+  </p:cSld>
+  <p:clrMapOvr>
+    <a:masterClrMapping/>
+  </p:clrMapOvr>
+  <p:timing>
+    <p:tnLst>
+      <p:par>
+        <p:cTn id="1" dur="indefinite" restart="never" nodeType="tmRoot"/>
+      </p:par>
+    </p:tnLst>
+  </p:timing>
+</p:sld>
+</file>
+
+<file path=ppt/slides/slide12.xml><?xml version="1.0" encoding="utf-8"?>
+<p:sld xmlns:a="http://schemas.openxmlformats.org/drawingml/2006/main" xmlns:r="http://schemas.openxmlformats.org/officeDocument/2006/relationships" xmlns:p="http://schemas.openxmlformats.org/presentationml/2006/main">
+  <p:cSld>
+    <p:spTree>
+      <p:nvGrpSpPr>
+        <p:cNvPr id="1" name=""/>
+        <p:cNvGrpSpPr/>
+        <p:nvPr/>
+      </p:nvGrpSpPr>
+      <p:grpSpPr>
+        <a:xfrm>
+          <a:off x="0" y="0"/>
+          <a:ext cx="0" cy="0"/>
+          <a:chOff x="0" y="0"/>
+          <a:chExt cx="0" cy="0"/>
+        </a:xfrm>
+      </p:grpSpPr>
+      <p:sp>
+        <p:nvSpPr>
+          <p:cNvPr id="2" name="Title 1"/>
+          <p:cNvSpPr>
+            <a:spLocks noGrp="1"/>
+          </p:cNvSpPr>
+          <p:nvPr>
+            <p:ph type="title"/>
+          </p:nvPr>
+        </p:nvSpPr>
+        <p:spPr/>
+        <p:txBody>
+          <a:bodyPr>
+            <a:normAutofit fontScale="90000"/>
+          </a:bodyPr>
+          <a:lstStyle/>
+          <a:p>
+            <a:r>
+              <a:rPr lang="en-GB" dirty="0" smtClean="0"/>
+              <a:t>Setting up your own remote repository</a:t>
+            </a:r>
+            <a:endParaRPr lang="en-GB" dirty="0"/>
+          </a:p>
+        </p:txBody>
+      </p:sp>
+      <p:sp>
+        <p:nvSpPr>
+          <p:cNvPr id="3" name="Content Placeholder 2"/>
+          <p:cNvSpPr>
+            <a:spLocks noGrp="1"/>
+          </p:cNvSpPr>
+          <p:nvPr>
+            <p:ph idx="1"/>
+          </p:nvPr>
+        </p:nvSpPr>
+        <p:spPr/>
+        <p:txBody>
+          <a:bodyPr/>
+          <a:lstStyle/>
+          <a:p>
+            <a:r>
+              <a:rPr lang="en-GB" dirty="0" smtClean="0"/>
+              <a:t>git clone --bare .git /</a:t>
+            </a:r>
+            <a:r>
+              <a:rPr lang="en-GB" dirty="0" err="1" smtClean="0"/>
+              <a:t>tmp</a:t>
+            </a:r>
+            <a:r>
+              <a:rPr lang="en-GB" dirty="0" smtClean="0"/>
+              <a:t>/myrepo.git</a:t>
+            </a:r>
+          </a:p>
+          <a:p>
+            <a:r>
+              <a:rPr lang="en-GB" dirty="0" err="1" smtClean="0"/>
+              <a:t>scp</a:t>
+            </a:r>
+            <a:r>
+              <a:rPr lang="en-GB" dirty="0" smtClean="0"/>
+              <a:t> /</a:t>
+            </a:r>
+            <a:r>
+              <a:rPr lang="en-GB" dirty="0" err="1" smtClean="0"/>
+              <a:t>tmp</a:t>
+            </a:r>
+            <a:r>
+              <a:rPr lang="en-GB" dirty="0" smtClean="0"/>
+              <a:t>/myrepo.git s0786898@jupiter1:~/myrepo.git</a:t>
+            </a:r>
+          </a:p>
+          <a:p>
+            <a:r>
+              <a:rPr lang="en-GB" dirty="0" smtClean="0"/>
+              <a:t>git remote add origin s0786898@jupiter1:~/myrepo.git</a:t>
+            </a:r>
+          </a:p>
+          <a:p>
+            <a:r>
+              <a:rPr lang="en-GB" dirty="0" smtClean="0"/>
+              <a:t>git pull origin master</a:t>
+            </a:r>
+          </a:p>
+          <a:p>
+            <a:r>
+              <a:rPr lang="en-GB" dirty="0" smtClean="0"/>
+              <a:t>git push origin master</a:t>
+            </a:r>
+            <a:endParaRPr lang="en-GB" dirty="0"/>
+          </a:p>
+        </p:txBody>
+      </p:sp>
+    </p:spTree>
+  </p:cSld>
+  <p:clrMapOvr>
+    <a:masterClrMapping/>
+  </p:clrMapOvr>
+  <p:timing>
+    <p:tnLst>
+      <p:par>
+        <p:cTn id="1" dur="indefinite" restart="never" nodeType="tmRoot"/>
+      </p:par>
+    </p:tnLst>
+  </p:timing>
+</p:sld>
+</file>
+
+<file path=ppt/slides/slide13.xml><?xml version="1.0" encoding="utf-8"?>
+<p:sld xmlns:a="http://schemas.openxmlformats.org/drawingml/2006/main" xmlns:r="http://schemas.openxmlformats.org/officeDocument/2006/relationships" xmlns:p="http://schemas.openxmlformats.org/presentationml/2006/main">
+  <p:cSld>
+    <p:spTree>
+      <p:nvGrpSpPr>
+        <p:cNvPr id="1" name=""/>
+        <p:cNvGrpSpPr/>
+        <p:nvPr/>
+      </p:nvGrpSpPr>
+      <p:grpSpPr>
+        <a:xfrm>
+          <a:off x="0" y="0"/>
+          <a:ext cx="0" cy="0"/>
+          <a:chOff x="0" y="0"/>
+          <a:chExt cx="0" cy="0"/>
+        </a:xfrm>
+      </p:grpSpPr>
+      <p:sp>
+        <p:nvSpPr>
+          <p:cNvPr id="2" name="Title 1"/>
+          <p:cNvSpPr>
+            <a:spLocks noGrp="1"/>
+          </p:cNvSpPr>
+          <p:nvPr>
+            <p:ph type="title"/>
+          </p:nvPr>
+        </p:nvSpPr>
+        <p:spPr/>
+        <p:txBody>
+          <a:bodyPr/>
+          <a:lstStyle/>
+          <a:p>
+            <a:r>
+              <a:rPr lang="en-GB" dirty="0" err="1" smtClean="0"/>
+              <a:t>GitHub</a:t>
+            </a:r>
+            <a:endParaRPr lang="en-GB" dirty="0"/>
+          </a:p>
+        </p:txBody>
+      </p:sp>
+      <p:sp>
+        <p:nvSpPr>
+          <p:cNvPr id="3" name="Content Placeholder 2"/>
+          <p:cNvSpPr>
+            <a:spLocks noGrp="1"/>
+          </p:cNvSpPr>
+          <p:nvPr>
+            <p:ph idx="1"/>
+          </p:nvPr>
+        </p:nvSpPr>
+        <p:spPr/>
+        <p:txBody>
+          <a:bodyPr/>
+          <a:lstStyle/>
+          <a:p>
+            <a:r>
+              <a:rPr lang="en-GB" dirty="0" smtClean="0"/>
+              <a:t>www.github.com</a:t>
+            </a:r>
+          </a:p>
+          <a:p>
+            <a:r>
+              <a:rPr lang="en-GB" dirty="0" smtClean="0"/>
+              <a:t>git remote add </a:t>
+            </a:r>
+            <a:r>
+              <a:rPr lang="en-GB" dirty="0" err="1" smtClean="0"/>
+              <a:t>github</a:t>
+            </a:r>
+            <a:r>
+              <a:rPr lang="en-GB" dirty="0" smtClean="0"/>
+              <a:t> </a:t>
+            </a:r>
+            <a:r>
+              <a:rPr lang="en-GB" dirty="0" err="1" smtClean="0"/>
+              <a:t>git@github.com:username</a:t>
+            </a:r>
+            <a:r>
+              <a:rPr lang="en-GB" dirty="0" smtClean="0"/>
+              <a:t>/repo_name.git</a:t>
+            </a:r>
+          </a:p>
+          <a:p>
+            <a:r>
+              <a:rPr lang="en-GB" dirty="0" smtClean="0"/>
+              <a:t>git push </a:t>
+            </a:r>
+            <a:r>
+              <a:rPr lang="en-GB" dirty="0" err="1" smtClean="0"/>
+              <a:t>github</a:t>
+            </a:r>
+            <a:endParaRPr lang="en-GB" dirty="0" smtClean="0"/>
+          </a:p>
+        </p:txBody>
+      </p:sp>
+    </p:spTree>
+  </p:cSld>
+  <p:clrMapOvr>
+    <a:masterClrMapping/>
+  </p:clrMapOvr>
+  <p:timing>
+    <p:tnLst>
+      <p:par>
+        <p:cTn id="1" dur="indefinite" restart="never" nodeType="tmRoot"/>
+      </p:par>
+    </p:tnLst>
+  </p:timing>
+</p:sld>
+</file>
+
+<file path=ppt/slides/slide14.xml><?xml version="1.0" encoding="utf-8"?>
+<p:sld xmlns:a="http://schemas.openxmlformats.org/drawingml/2006/main" xmlns:r="http://schemas.openxmlformats.org/officeDocument/2006/relationships" xmlns:p="http://schemas.openxmlformats.org/presentationml/2006/main">
+  <p:cSld>
+    <p:spTree>
+      <p:nvGrpSpPr>
+        <p:cNvPr id="1" name=""/>
+        <p:cNvGrpSpPr/>
+        <p:nvPr/>
+      </p:nvGrpSpPr>
+      <p:grpSpPr>
+        <a:xfrm>
+          <a:off x="0" y="0"/>
+          <a:ext cx="0" cy="0"/>
+          <a:chOff x="0" y="0"/>
+          <a:chExt cx="0" cy="0"/>
+        </a:xfrm>
+      </p:grpSpPr>
+      <p:sp>
+        <p:nvSpPr>
+          <p:cNvPr id="2" name="Title 1"/>
+          <p:cNvSpPr>
+            <a:spLocks noGrp="1"/>
+          </p:cNvSpPr>
+          <p:nvPr>
+            <p:ph type="title"/>
+          </p:nvPr>
+        </p:nvSpPr>
+        <p:spPr/>
+        <p:txBody>
+          <a:bodyPr/>
+          <a:lstStyle/>
+          <a:p>
+            <a:r>
+              <a:rPr lang="en-GB" dirty="0" smtClean="0"/>
+              <a:t>PART ii: Collaborating with others</a:t>
+            </a:r>
+            <a:endParaRPr lang="en-GB" dirty="0"/>
+          </a:p>
+        </p:txBody>
+      </p:sp>
+      <p:sp>
+        <p:nvSpPr>
+          <p:cNvPr id="3" name="Text Placeholder 2"/>
+          <p:cNvSpPr>
+            <a:spLocks noGrp="1"/>
+          </p:cNvSpPr>
+          <p:nvPr>
+            <p:ph type="body" idx="1"/>
+          </p:nvPr>
+        </p:nvSpPr>
+        <p:spPr/>
+        <p:txBody>
+          <a:bodyPr/>
+          <a:lstStyle/>
+          <a:p>
+            <a:endParaRPr lang="en-GB"/>
+          </a:p>
+        </p:txBody>
+      </p:sp>
+    </p:spTree>
+  </p:cSld>
+  <p:clrMapOvr>
+    <a:masterClrMapping/>
+  </p:clrMapOvr>
+  <p:timing>
+    <p:tnLst>
+      <p:par>
+        <p:cTn id="1" dur="indefinite" restart="never" nodeType="tmRoot"/>
+      </p:par>
+    </p:tnLst>
+  </p:timing>
+</p:sld>
+</file>
+
+<file path=ppt/slides/slide15.xml><?xml version="1.0" encoding="utf-8"?>
+<p:sld xmlns:a="http://schemas.openxmlformats.org/drawingml/2006/main" xmlns:r="http://schemas.openxmlformats.org/officeDocument/2006/relationships" xmlns:p="http://schemas.openxmlformats.org/presentationml/2006/main">
+  <p:cSld>
+    <p:spTree>
+      <p:nvGrpSpPr>
+        <p:cNvPr id="1" name=""/>
+        <p:cNvGrpSpPr/>
+        <p:nvPr/>
+      </p:nvGrpSpPr>
+      <p:grpSpPr>
+        <a:xfrm>
+          <a:off x="0" y="0"/>
+          <a:ext cx="0" cy="0"/>
+          <a:chOff x="0" y="0"/>
+          <a:chExt cx="0" cy="0"/>
+        </a:xfrm>
+      </p:grpSpPr>
+      <p:sp>
+        <p:nvSpPr>
+          <p:cNvPr id="4" name="Title 3"/>
+          <p:cNvSpPr>
+            <a:spLocks noGrp="1"/>
+          </p:cNvSpPr>
+          <p:nvPr>
+            <p:ph type="title"/>
+          </p:nvPr>
+        </p:nvSpPr>
+        <p:spPr/>
+        <p:txBody>
+          <a:bodyPr/>
+          <a:lstStyle/>
+          <a:p>
+            <a:r>
+              <a:rPr lang="en-GB" dirty="0" smtClean="0"/>
+              <a:t>Typical workflow</a:t>
+            </a:r>
+            <a:endParaRPr lang="en-GB" dirty="0"/>
+          </a:p>
+        </p:txBody>
+      </p:sp>
+      <p:sp>
+        <p:nvSpPr>
+          <p:cNvPr id="5" name="Content Placeholder 4"/>
+          <p:cNvSpPr>
+            <a:spLocks noGrp="1"/>
+          </p:cNvSpPr>
+          <p:nvPr>
+            <p:ph idx="1"/>
+          </p:nvPr>
+        </p:nvSpPr>
+        <p:spPr/>
+        <p:txBody>
+          <a:bodyPr>
+            <a:normAutofit fontScale="92500" lnSpcReduction="10000"/>
+          </a:bodyPr>
+          <a:lstStyle/>
+          <a:p>
+            <a:r>
+              <a:rPr lang="en-GB" dirty="0" smtClean="0"/>
+              <a:t>One main repository with write access limited to selected developers.</a:t>
+            </a:r>
+          </a:p>
+          <a:p>
+            <a:r>
+              <a:rPr lang="en-GB" dirty="0" smtClean="0"/>
+              <a:t>Every dev has his own copy of the repository.</a:t>
+            </a:r>
+          </a:p>
+          <a:p>
+            <a:r>
+              <a:rPr lang="en-GB" dirty="0" smtClean="0"/>
+              <a:t>Every feature or </a:t>
+            </a:r>
+            <a:r>
+              <a:rPr lang="en-GB" dirty="0" err="1" smtClean="0"/>
+              <a:t>bugfix</a:t>
+            </a:r>
+            <a:r>
+              <a:rPr lang="en-GB" dirty="0" smtClean="0"/>
+              <a:t> is developed in a separate branch.</a:t>
+            </a:r>
+          </a:p>
+          <a:p>
+            <a:r>
+              <a:rPr lang="en-GB" dirty="0" smtClean="0"/>
+              <a:t>When the work is done the developer ask one of others to "pull" his branch.</a:t>
+            </a:r>
+          </a:p>
+          <a:p>
+            <a:r>
+              <a:rPr lang="en-GB" dirty="0" smtClean="0"/>
+              <a:t>His branch is then evaluated and after optional changes merged into the main repository.</a:t>
+            </a:r>
+            <a:endParaRPr lang="en-GB" dirty="0"/>
+          </a:p>
+        </p:txBody>
+      </p:sp>
+    </p:spTree>
+  </p:cSld>
+  <p:clrMapOvr>
+    <a:masterClrMapping/>
+  </p:clrMapOvr>
+  <p:timing>
+    <p:tnLst>
+      <p:par>
+        <p:cTn id="1" dur="indefinite" restart="never" nodeType="tmRoot"/>
+      </p:par>
+    </p:tnLst>
+  </p:timing>
+</p:sld>
+</file>
+
+<file path=ppt/slides/slide16.xml><?xml version="1.0" encoding="utf-8"?>
+<p:sld xmlns:a="http://schemas.openxmlformats.org/drawingml/2006/main" xmlns:r="http://schemas.openxmlformats.org/officeDocument/2006/relationships" xmlns:p="http://schemas.openxmlformats.org/presentationml/2006/main">
+  <p:cSld>
+    <p:spTree>
+      <p:nvGrpSpPr>
+        <p:cNvPr id="1" name=""/>
+        <p:cNvGrpSpPr/>
+        <p:nvPr/>
+      </p:nvGrpSpPr>
+      <p:grpSpPr>
+        <a:xfrm>
+          <a:off x="0" y="0"/>
+          <a:ext cx="0" cy="0"/>
+          <a:chOff x="0" y="0"/>
+          <a:chExt cx="0" cy="0"/>
+        </a:xfrm>
+      </p:grpSpPr>
+      <p:sp>
+        <p:nvSpPr>
+          <p:cNvPr id="4" name="Title 3"/>
+          <p:cNvSpPr>
+            <a:spLocks noGrp="1"/>
+          </p:cNvSpPr>
+          <p:nvPr>
+            <p:ph type="title"/>
+          </p:nvPr>
+        </p:nvSpPr>
+        <p:spPr/>
+        <p:txBody>
+          <a:bodyPr/>
+          <a:lstStyle/>
+          <a:p>
+            <a:r>
+              <a:rPr lang="en-GB" dirty="0" err="1" smtClean="0"/>
+              <a:t>Nipype</a:t>
+            </a:r>
+            <a:r>
+              <a:rPr lang="en-GB" dirty="0" smtClean="0"/>
+              <a:t> example</a:t>
+            </a:r>
+            <a:endParaRPr lang="en-GB" dirty="0"/>
+          </a:p>
+        </p:txBody>
+      </p:sp>
+      <p:sp>
+        <p:nvSpPr>
+          <p:cNvPr id="5" name="Content Placeholder 4"/>
+          <p:cNvSpPr>
+            <a:spLocks noGrp="1"/>
+          </p:cNvSpPr>
+          <p:nvPr>
+            <p:ph idx="1"/>
+          </p:nvPr>
+        </p:nvSpPr>
+        <p:spPr/>
+        <p:txBody>
+          <a:bodyPr>
+            <a:normAutofit/>
+          </a:bodyPr>
+          <a:lstStyle/>
+          <a:p>
+            <a:pPr>
+              <a:buNone/>
+            </a:pPr>
+            <a:endParaRPr lang="en-GB" dirty="0"/>
+          </a:p>
+        </p:txBody>
+      </p:sp>
+    </p:spTree>
+  </p:cSld>
+  <p:clrMapOvr>
+    <a:masterClrMapping/>
+  </p:clrMapOvr>
+  <p:timing>
+    <p:tnLst>
+      <p:par>
+        <p:cTn id="1" dur="indefinite" restart="never" nodeType="tmRoot"/>
+      </p:par>
+    </p:tnLst>
+  </p:timing>
+</p:sld>
+</file>
+
+<file path=ppt/slides/slide17.xml><?xml version="1.0" encoding="utf-8"?>
+<p:sld xmlns:a="http://schemas.openxmlformats.org/drawingml/2006/main" xmlns:r="http://schemas.openxmlformats.org/officeDocument/2006/relationships" xmlns:p="http://schemas.openxmlformats.org/presentationml/2006/main">
+  <p:cSld>
+    <p:spTree>
+      <p:nvGrpSpPr>
+        <p:cNvPr id="1" name=""/>
+        <p:cNvGrpSpPr/>
+        <p:nvPr/>
+      </p:nvGrpSpPr>
+      <p:grpSpPr>
+        <a:xfrm>
+          <a:off x="0" y="0"/>
+          <a:ext cx="0" cy="0"/>
+          <a:chOff x="0" y="0"/>
+          <a:chExt cx="0" cy="0"/>
+        </a:xfrm>
+      </p:grpSpPr>
+      <p:sp>
+        <p:nvSpPr>
+          <p:cNvPr id="2" name="Title 1"/>
+          <p:cNvSpPr>
+            <a:spLocks noGrp="1"/>
+          </p:cNvSpPr>
+          <p:nvPr>
+            <p:ph type="title"/>
+          </p:nvPr>
+        </p:nvSpPr>
+        <p:spPr/>
+        <p:txBody>
+          <a:bodyPr/>
+          <a:lstStyle/>
+          <a:p>
+            <a:r>
+              <a:rPr lang="en-GB" dirty="0" smtClean="0"/>
+              <a:t>Useful links</a:t>
+            </a:r>
+            <a:endParaRPr lang="en-GB" dirty="0"/>
+          </a:p>
+        </p:txBody>
+      </p:sp>
+      <p:sp>
+        <p:nvSpPr>
+          <p:cNvPr id="3" name="Content Placeholder 2"/>
+          <p:cNvSpPr>
+            <a:spLocks noGrp="1"/>
+          </p:cNvSpPr>
+          <p:nvPr>
+            <p:ph idx="1"/>
+          </p:nvPr>
+        </p:nvSpPr>
+        <p:spPr/>
+        <p:txBody>
+          <a:bodyPr/>
+          <a:lstStyle/>
+          <a:p>
+            <a:r>
+              <a:rPr lang="en-GB" dirty="0" smtClean="0">
+                <a:hlinkClick r:id="rId2"/>
+              </a:rPr>
+              <a:t>ww.progit.org</a:t>
+            </a:r>
+            <a:endParaRPr lang="en-GB" dirty="0" smtClean="0"/>
+          </a:p>
+          <a:p>
+            <a:r>
+              <a:rPr lang="en-GB" dirty="0" smtClean="0">
+                <a:hlinkClick r:id="rId3"/>
+              </a:rPr>
+              <a:t>www.syntevo.com/smartgit/index.html</a:t>
+            </a:r>
+            <a:endParaRPr lang="en-GB" dirty="0" smtClean="0"/>
+          </a:p>
+          <a:p>
+            <a:r>
+              <a:rPr lang="en-GB" smtClean="0">
+                <a:hlinkClick r:id="rId4"/>
+              </a:rPr>
+              <a:t>hoth.entp.com/output/git_for_designers.html</a:t>
+            </a:r>
+            <a:endParaRPr lang="en-GB" dirty="0" smtClean="0"/>
+          </a:p>
+        </p:txBody>
+      </p:sp>
+    </p:spTree>
+  </p:cSld>
+  <p:clrMapOvr>
+    <a:masterClrMapping/>
+  </p:clrMapOvr>
 </p:sld>
 </file>
 
@@ -3127,7 +3985,15 @@
           <a:p>
             <a:r>
               <a:rPr lang="en-GB" dirty="0" smtClean="0"/>
-              <a:t>Why?</a:t>
+              <a:t>Part </a:t>
+            </a:r>
+            <a:r>
+              <a:rPr lang="en-GB" dirty="0" err="1" smtClean="0"/>
+              <a:t>i</a:t>
+            </a:r>
+            <a:r>
+              <a:rPr lang="en-GB" dirty="0" smtClean="0"/>
+              <a:t>: Using Git at your own</a:t>
             </a:r>
             <a:endParaRPr lang="en-GB" dirty="0"/>
           </a:p>
@@ -3135,42 +4001,20 @@
       </p:sp>
       <p:sp>
         <p:nvSpPr>
-          <p:cNvPr id="3" name="Content Placeholder 2"/>
-          <p:cNvSpPr>
-            <a:spLocks noGrp="1"/>
-          </p:cNvSpPr>
-          <p:nvPr>
-            <p:ph idx="1"/>
-          </p:nvPr>
-        </p:nvSpPr>
-        <p:spPr/>
-        <p:txBody>
-          <a:bodyPr/>
-          <a:lstStyle/>
-          <a:p>
-            <a:r>
-              <a:rPr lang="en-GB" dirty="0" smtClean="0"/>
-              <a:t>You back up your code.</a:t>
-            </a:r>
-          </a:p>
-          <a:p>
-            <a:r>
-              <a:rPr lang="en-GB" dirty="0" smtClean="0"/>
-              <a:t>You can experiment with new ideas without being afraid that you will forget how to get back to a working solution.</a:t>
-            </a:r>
-          </a:p>
-          <a:p>
-            <a:r>
-              <a:rPr lang="en-GB" dirty="0" smtClean="0"/>
-              <a:t>You track your progress.</a:t>
-            </a:r>
-          </a:p>
-          <a:p>
-            <a:r>
-              <a:rPr lang="en-GB" dirty="0" smtClean="0"/>
-              <a:t>You can collaborate with other researchers.</a:t>
-            </a:r>
-            <a:endParaRPr lang="en-GB" dirty="0"/>
+          <p:cNvPr id="3" name="Text Placeholder 2"/>
+          <p:cNvSpPr>
+            <a:spLocks noGrp="1"/>
+          </p:cNvSpPr>
+          <p:nvPr>
+            <p:ph type="body" idx="1"/>
+          </p:nvPr>
+        </p:nvSpPr>
+        <p:spPr/>
+        <p:txBody>
+          <a:bodyPr/>
+          <a:lstStyle/>
+          <a:p>
+            <a:endParaRPr lang="en-GB"/>
           </a:p>
         </p:txBody>
       </p:sp>
@@ -3179,6 +4023,13 @@
   <p:clrMapOvr>
     <a:masterClrMapping/>
   </p:clrMapOvr>
+  <p:timing>
+    <p:tnLst>
+      <p:par>
+        <p:cTn id="1" dur="indefinite" restart="never" nodeType="tmRoot"/>
+      </p:par>
+    </p:tnLst>
+  </p:timing>
 </p:sld>
 </file>
 
@@ -3216,7 +4067,7 @@
           <a:p>
             <a:r>
               <a:rPr lang="en-GB" dirty="0" smtClean="0"/>
-              <a:t>Typical work flow</a:t>
+              <a:t>Why?</a:t>
             </a:r>
             <a:endParaRPr lang="en-GB" dirty="0"/>
           </a:p>
@@ -3237,46 +4088,28 @@
           <a:bodyPr/>
           <a:lstStyle/>
           <a:p>
-            <a:pPr marL="514350" indent="-514350">
-              <a:buFont typeface="+mj-lt"/>
-              <a:buAutoNum type="arabicPeriod"/>
-            </a:pPr>
-            <a:r>
-              <a:rPr lang="en-GB" dirty="0" smtClean="0"/>
-              <a:t>Make changes, simulate, generate figures etc.</a:t>
-            </a:r>
-          </a:p>
-          <a:p>
-            <a:pPr marL="514350" indent="-514350">
-              <a:buFont typeface="+mj-lt"/>
-              <a:buAutoNum type="arabicPeriod"/>
-            </a:pPr>
-            <a:r>
-              <a:rPr lang="en-GB" dirty="0" smtClean="0"/>
-              <a:t>Reach a significant stage (working solution, end of the day etc.)</a:t>
-            </a:r>
-          </a:p>
-          <a:p>
-            <a:pPr marL="514350" indent="-514350">
-              <a:buFont typeface="+mj-lt"/>
-              <a:buAutoNum type="arabicPeriod"/>
-            </a:pPr>
-            <a:r>
-              <a:rPr lang="en-GB" dirty="0" smtClean="0"/>
-              <a:t>Commit! (make a snapshot of your code)</a:t>
-            </a:r>
-          </a:p>
-          <a:p>
-            <a:pPr marL="514350" indent="-514350">
-              <a:buFont typeface="+mj-lt"/>
-              <a:buAutoNum type="arabicPeriod"/>
-            </a:pPr>
-            <a:r>
-              <a:rPr lang="en-GB" dirty="0" smtClean="0"/>
-              <a:t>Go to 1. until receiving a degree.</a:t>
-            </a:r>
-          </a:p>
-          <a:p>
+            <a:r>
+              <a:rPr lang="en-GB" dirty="0" smtClean="0"/>
+              <a:t>You back up your code.</a:t>
+            </a:r>
+          </a:p>
+          <a:p>
+            <a:r>
+              <a:rPr lang="en-GB" dirty="0" smtClean="0"/>
+              <a:t>You can experiment with new ideas without being afraid that you will forget how to get back to a working solution.</a:t>
+            </a:r>
+          </a:p>
+          <a:p>
+            <a:r>
+              <a:rPr lang="en-GB" dirty="0" smtClean="0"/>
+              <a:t>You track your progress.</a:t>
+            </a:r>
+          </a:p>
+          <a:p>
+            <a:r>
+              <a:rPr lang="en-GB" dirty="0" smtClean="0"/>
+              <a:t>You can collaborate with other researchers.</a:t>
+            </a:r>
             <a:endParaRPr lang="en-GB" dirty="0"/>
           </a:p>
         </p:txBody>
@@ -3286,6 +4119,13 @@
   <p:clrMapOvr>
     <a:masterClrMapping/>
   </p:clrMapOvr>
+  <p:timing>
+    <p:tnLst>
+      <p:par>
+        <p:cTn id="1" dur="indefinite" restart="never" nodeType="tmRoot"/>
+      </p:par>
+    </p:tnLst>
+  </p:timing>
 </p:sld>
 </file>
 
@@ -3323,7 +4163,7 @@
           <a:p>
             <a:r>
               <a:rPr lang="en-GB" dirty="0" smtClean="0"/>
-              <a:t>How to get started</a:t>
+              <a:t>Lingo</a:t>
             </a:r>
             <a:endParaRPr lang="en-GB" dirty="0"/>
           </a:p>
@@ -3344,7 +4184,19 @@
           <a:bodyPr/>
           <a:lstStyle/>
           <a:p>
-            <a:endParaRPr lang="en-GB"/>
+            <a:r>
+              <a:rPr lang="en-GB" dirty="0" smtClean="0"/>
+              <a:t>Commit - a snapshot of your files.</a:t>
+            </a:r>
+          </a:p>
+          <a:p>
+            <a:r>
+              <a:rPr lang="en-GB" dirty="0" smtClean="0"/>
+              <a:t>Repository - a local or remote set of commits.</a:t>
+            </a:r>
+          </a:p>
+          <a:p>
+            <a:endParaRPr lang="en-GB" dirty="0"/>
           </a:p>
         </p:txBody>
       </p:sp>
@@ -3353,6 +4205,13 @@
   <p:clrMapOvr>
     <a:masterClrMapping/>
   </p:clrMapOvr>
+  <p:timing>
+    <p:tnLst>
+      <p:par>
+        <p:cTn id="1" dur="indefinite" restart="never" nodeType="tmRoot"/>
+      </p:par>
+    </p:tnLst>
+  </p:timing>
 </p:sld>
 </file>
 
@@ -3390,7 +4249,7 @@
           <a:p>
             <a:r>
               <a:rPr lang="en-GB" dirty="0" smtClean="0"/>
-              <a:t>Checking in changes</a:t>
+              <a:t>Typical workflow</a:t>
             </a:r>
             <a:endParaRPr lang="en-GB" dirty="0"/>
           </a:p>
@@ -3411,7 +4270,47 @@
           <a:bodyPr/>
           <a:lstStyle/>
           <a:p>
-            <a:endParaRPr lang="en-GB"/>
+            <a:pPr marL="514350" indent="-514350">
+              <a:buFont typeface="+mj-lt"/>
+              <a:buAutoNum type="arabicPeriod"/>
+            </a:pPr>
+            <a:r>
+              <a:rPr lang="en-GB" dirty="0" smtClean="0"/>
+              <a:t>Make changes, simulate, generate figures etc.</a:t>
+            </a:r>
+          </a:p>
+          <a:p>
+            <a:pPr marL="514350" indent="-514350">
+              <a:buFont typeface="+mj-lt"/>
+              <a:buAutoNum type="arabicPeriod"/>
+            </a:pPr>
+            <a:r>
+              <a:rPr lang="en-GB" dirty="0" smtClean="0"/>
+              <a:t>Reach a significant stage (working solution, end of the day etc.)</a:t>
+            </a:r>
+          </a:p>
+          <a:p>
+            <a:pPr marL="514350" indent="-514350">
+              <a:buFont typeface="+mj-lt"/>
+              <a:buAutoNum type="arabicPeriod"/>
+            </a:pPr>
+            <a:r>
+              <a:rPr lang="en-GB" dirty="0" smtClean="0"/>
+              <a:t>Commit! (make a snapshot of your code)</a:t>
+            </a:r>
+          </a:p>
+          <a:p>
+            <a:pPr marL="514350" indent="-514350">
+              <a:buFont typeface="+mj-lt"/>
+              <a:buAutoNum type="arabicPeriod"/>
+            </a:pPr>
+            <a:r>
+              <a:rPr lang="en-GB" dirty="0" smtClean="0"/>
+              <a:t>Go to 1. until receiving a degree.</a:t>
+            </a:r>
+          </a:p>
+          <a:p>
+            <a:endParaRPr lang="en-GB" dirty="0"/>
           </a:p>
         </p:txBody>
       </p:sp>
@@ -3420,6 +4319,13 @@
   <p:clrMapOvr>
     <a:masterClrMapping/>
   </p:clrMapOvr>
+  <p:timing>
+    <p:tnLst>
+      <p:par>
+        <p:cTn id="1" dur="indefinite" restart="never" nodeType="tmRoot"/>
+      </p:par>
+    </p:tnLst>
+  </p:timing>
 </p:sld>
 </file>
 
@@ -3452,14 +4358,12 @@
         </p:nvSpPr>
         <p:spPr/>
         <p:txBody>
-          <a:bodyPr>
-            <a:normAutofit fontScale="90000"/>
-          </a:bodyPr>
-          <a:lstStyle/>
-          <a:p>
-            <a:r>
-              <a:rPr lang="en-GB" dirty="0" smtClean="0"/>
-              <a:t>Checking history and reverting changes</a:t>
+          <a:bodyPr/>
+          <a:lstStyle/>
+          <a:p>
+            <a:r>
+              <a:rPr lang="en-GB" dirty="0" smtClean="0"/>
+              <a:t>How to get started</a:t>
             </a:r>
             <a:endParaRPr lang="en-GB" dirty="0"/>
           </a:p>
@@ -3480,7 +4384,27 @@
           <a:bodyPr/>
           <a:lstStyle/>
           <a:p>
-            <a:endParaRPr lang="en-GB"/>
+            <a:r>
+              <a:rPr lang="en-GB" dirty="0" err="1" smtClean="0"/>
+              <a:t>cd</a:t>
+            </a:r>
+            <a:r>
+              <a:rPr lang="en-GB" dirty="0" smtClean="0"/>
+              <a:t> dir/with/sources</a:t>
+            </a:r>
+          </a:p>
+          <a:p>
+            <a:r>
+              <a:rPr lang="en-GB" dirty="0" smtClean="0"/>
+              <a:t>git init</a:t>
+            </a:r>
+          </a:p>
+          <a:p>
+            <a:r>
+              <a:rPr lang="en-GB" dirty="0" smtClean="0"/>
+              <a:t>git add .</a:t>
+            </a:r>
+            <a:endParaRPr lang="en-GB" dirty="0"/>
           </a:p>
         </p:txBody>
       </p:sp>
@@ -3489,6 +4413,13 @@
   <p:clrMapOvr>
     <a:masterClrMapping/>
   </p:clrMapOvr>
+  <p:timing>
+    <p:tnLst>
+      <p:par>
+        <p:cTn id="1" dur="indefinite" restart="never" nodeType="tmRoot"/>
+      </p:par>
+    </p:tnLst>
+  </p:timing>
 </p:sld>
 </file>
 
@@ -3526,7 +4457,7 @@
           <a:p>
             <a:r>
               <a:rPr lang="en-GB" dirty="0" smtClean="0"/>
-              <a:t>Branching and merging</a:t>
+              <a:t>Checking in changes</a:t>
             </a:r>
             <a:endParaRPr lang="en-GB" dirty="0"/>
           </a:p>
@@ -3547,7 +4478,32 @@
           <a:bodyPr/>
           <a:lstStyle/>
           <a:p>
-            <a:endParaRPr lang="en-GB"/>
+            <a:r>
+              <a:rPr lang="en-GB" dirty="0" smtClean="0"/>
+              <a:t>git add &lt;files&gt;</a:t>
+            </a:r>
+          </a:p>
+          <a:p>
+            <a:r>
+              <a:rPr lang="en-GB" dirty="0" smtClean="0"/>
+              <a:t>git commit</a:t>
+            </a:r>
+          </a:p>
+          <a:p>
+            <a:pPr>
+              <a:buNone/>
+            </a:pPr>
+            <a:r>
+              <a:rPr lang="en-GB" dirty="0" smtClean="0"/>
+              <a:t>or</a:t>
+            </a:r>
+          </a:p>
+          <a:p>
+            <a:r>
+              <a:rPr lang="en-GB" dirty="0" smtClean="0"/>
+              <a:t>git commit -a</a:t>
+            </a:r>
+            <a:endParaRPr lang="en-GB" dirty="0"/>
           </a:p>
         </p:txBody>
       </p:sp>
@@ -3556,6 +4512,13 @@
   <p:clrMapOvr>
     <a:masterClrMapping/>
   </p:clrMapOvr>
+  <p:timing>
+    <p:tnLst>
+      <p:par>
+        <p:cTn id="1" dur="indefinite" restart="never" nodeType="tmRoot"/>
+      </p:par>
+    </p:tnLst>
+  </p:timing>
 </p:sld>
 </file>
 
@@ -3595,7 +4558,7 @@
           <a:p>
             <a:r>
               <a:rPr lang="en-GB" dirty="0" smtClean="0"/>
-              <a:t>Setting up your own remote repository</a:t>
+              <a:t>Checking history and reverting changes</a:t>
             </a:r>
             <a:endParaRPr lang="en-GB" dirty="0"/>
           </a:p>
@@ -3616,7 +4579,31 @@
           <a:bodyPr/>
           <a:lstStyle/>
           <a:p>
-            <a:endParaRPr lang="en-GB"/>
+            <a:r>
+              <a:rPr lang="en-GB" dirty="0" smtClean="0"/>
+              <a:t>git log</a:t>
+            </a:r>
+          </a:p>
+          <a:p>
+            <a:r>
+              <a:rPr lang="en-GB" dirty="0" smtClean="0"/>
+              <a:t>git log –p </a:t>
+            </a:r>
+          </a:p>
+          <a:p>
+            <a:r>
+              <a:rPr lang="en-GB" dirty="0" smtClean="0"/>
+              <a:t>git log –stat</a:t>
+            </a:r>
+          </a:p>
+          <a:p>
+            <a:endParaRPr lang="en-GB" dirty="0" smtClean="0"/>
+          </a:p>
+          <a:p>
+            <a:r>
+              <a:rPr lang="en-GB" dirty="0" smtClean="0"/>
+              <a:t>git checkout &lt;commit SHA&gt;</a:t>
+            </a:r>
           </a:p>
         </p:txBody>
       </p:sp>
@@ -3625,6 +4612,13 @@
   <p:clrMapOvr>
     <a:masterClrMapping/>
   </p:clrMapOvr>
+  <p:timing>
+    <p:tnLst>
+      <p:par>
+        <p:cTn id="1" dur="indefinite" restart="never" nodeType="tmRoot"/>
+      </p:par>
+    </p:tnLst>
+  </p:timing>
 </p:sld>
 </file>
 
@@ -3661,8 +4655,8 @@
           <a:lstStyle/>
           <a:p>
             <a:r>
-              <a:rPr lang="en-GB" dirty="0" err="1" smtClean="0"/>
-              <a:t>GitHub</a:t>
+              <a:rPr lang="en-GB" dirty="0" smtClean="0"/>
+              <a:t>Correcting mistakes</a:t>
             </a:r>
             <a:endParaRPr lang="en-GB" dirty="0"/>
           </a:p>
@@ -3680,10 +4674,71 @@
         </p:nvSpPr>
         <p:spPr/>
         <p:txBody>
-          <a:bodyPr/>
-          <a:lstStyle/>
-          <a:p>
-            <a:endParaRPr lang="en-GB"/>
+          <a:bodyPr>
+            <a:normAutofit/>
+          </a:bodyPr>
+          <a:lstStyle/>
+          <a:p>
+            <a:r>
+              <a:rPr lang="en-GB" dirty="0" smtClean="0"/>
+              <a:t>Reverting a commit:</a:t>
+            </a:r>
+          </a:p>
+          <a:p>
+            <a:pPr lvl="1">
+              <a:buNone/>
+            </a:pPr>
+            <a:r>
+              <a:rPr lang="en-GB" dirty="0" smtClean="0"/>
+              <a:t>git revert &lt;commit SHA&gt;</a:t>
+            </a:r>
+          </a:p>
+          <a:p>
+            <a:r>
+              <a:rPr lang="en-GB" dirty="0" smtClean="0"/>
+              <a:t>Discarding uncommitted changes:</a:t>
+            </a:r>
+          </a:p>
+          <a:p>
+            <a:pPr lvl="1"/>
+            <a:r>
+              <a:rPr lang="en-GB" dirty="0" smtClean="0"/>
+              <a:t>everything:</a:t>
+            </a:r>
+          </a:p>
+          <a:p>
+            <a:pPr lvl="1">
+              <a:buNone/>
+            </a:pPr>
+            <a:r>
+              <a:rPr lang="en-GB" dirty="0" smtClean="0"/>
+              <a:t>	git reset --hard HEAD</a:t>
+            </a:r>
+          </a:p>
+          <a:p>
+            <a:pPr lvl="1">
+              <a:buFontTx/>
+              <a:buChar char="-"/>
+            </a:pPr>
+            <a:r>
+              <a:rPr lang="en-GB" dirty="0" smtClean="0"/>
+              <a:t>one file:</a:t>
+            </a:r>
+          </a:p>
+          <a:p>
+            <a:pPr lvl="1">
+              <a:buNone/>
+            </a:pPr>
+            <a:r>
+              <a:rPr lang="en-GB" dirty="0" smtClean="0"/>
+              <a:t>	git checkout HEAD filename	</a:t>
+            </a:r>
+          </a:p>
+          <a:p>
+            <a:pPr lvl="1">
+              <a:buNone/>
+            </a:pPr>
+            <a:endParaRPr lang="en-GB" dirty="0" smtClean="0"/>
           </a:p>
         </p:txBody>
       </p:sp>
@@ -3692,6 +4747,13 @@
   <p:clrMapOvr>
     <a:masterClrMapping/>
   </p:clrMapOvr>
+  <p:timing>
+    <p:tnLst>
+      <p:par>
+        <p:cTn id="1" dur="indefinite" restart="never" nodeType="tmRoot"/>
+      </p:par>
+    </p:tnLst>
+  </p:timing>
 </p:sld>
 </file>
 

</xml_diff>